<commit_message>
update after session 18August
</commit_message>
<xml_diff>
--- a/P3_soussand_yoan/P3_02_architecture/P3_02_architecture.pptx
+++ b/P3_soussand_yoan/P3_02_architecture/P3_02_architecture.pptx
@@ -137,8 +137,8 @@
 <pc:chgInfo xmlns:a="http://schemas.openxmlformats.org/drawingml/2006/main" xmlns:r="http://schemas.openxmlformats.org/officeDocument/2006/relationships" xmlns:ac="http://schemas.microsoft.com/office/drawing/2013/main/command" xmlns:pc="http://schemas.microsoft.com/office/powerpoint/2013/main/command">
   <pc:docChgLst>
     <pc:chgData name="Soussand, Yoan" userId="6c304db6-38ce-44e5-ba9b-3778b08966c2" providerId="ADAL" clId="{ED4E84CA-539B-F14D-8B36-AC637F884A74}"/>
-    <pc:docChg chg="undo custSel addSld modSld">
-      <pc:chgData name="Soussand, Yoan" userId="6c304db6-38ce-44e5-ba9b-3778b08966c2" providerId="ADAL" clId="{ED4E84CA-539B-F14D-8B36-AC637F884A74}" dt="2021-08-18T07:38:39.531" v="1312" actId="26606"/>
+    <pc:docChg chg="undo custSel mod addSld modSld modMainMaster">
+      <pc:chgData name="Soussand, Yoan" userId="6c304db6-38ce-44e5-ba9b-3778b08966c2" providerId="ADAL" clId="{ED4E84CA-539B-F14D-8B36-AC637F884A74}" dt="2021-08-18T11:46:26.434" v="1314" actId="33475"/>
       <pc:docMkLst>
         <pc:docMk/>
       </pc:docMkLst>
@@ -1259,6 +1259,21 @@
           </ac:picMkLst>
         </pc:picChg>
       </pc:sldChg>
+      <pc:sldMasterChg chg="addSp mod">
+        <pc:chgData name="Soussand, Yoan" userId="6c304db6-38ce-44e5-ba9b-3778b08966c2" providerId="ADAL" clId="{ED4E84CA-539B-F14D-8B36-AC637F884A74}" dt="2021-08-18T11:46:26.429" v="1313" actId="33475"/>
+        <pc:sldMasterMkLst>
+          <pc:docMk/>
+          <pc:sldMasterMk cId="168012239" sldId="2147484032"/>
+        </pc:sldMasterMkLst>
+        <pc:spChg chg="add">
+          <ac:chgData name="Soussand, Yoan" userId="6c304db6-38ce-44e5-ba9b-3778b08966c2" providerId="ADAL" clId="{ED4E84CA-539B-F14D-8B36-AC637F884A74}" dt="2021-08-18T11:46:26.429" v="1313" actId="33475"/>
+          <ac:spMkLst>
+            <pc:docMk/>
+            <pc:sldMasterMk cId="168012239" sldId="2147484032"/>
+            <ac:spMk id="9" creationId="{F31A6BE7-22C3-4640-8B00-FD807176A885}"/>
+          </ac:spMkLst>
+        </pc:spChg>
+      </pc:sldMasterChg>
     </pc:docChg>
   </pc:docChgLst>
 </pc:chgInfo>
@@ -10672,6 +10687,53 @@
           </a:p>
         </p:txBody>
       </p:sp>
+      <p:sp>
+        <p:nvSpPr>
+          <p:cNvPr id="9" name="ZoneTexte 8">
+            <a:extLst>
+              <a:ext uri="{FF2B5EF4-FFF2-40B4-BE49-F238E27FC236}">
+                <a16:creationId xmlns:a16="http://schemas.microsoft.com/office/drawing/2014/main" id="{F31A6BE7-22C3-4640-8B00-FD807176A885}"/>
+              </a:ext>
+            </a:extLst>
+          </p:cNvPr>
+          <p:cNvSpPr txBox="1"/>
+          <p:nvPr userDrawn="1">
+            <p:extLst>
+              <p:ext uri="{1162E1C5-73C7-4A58-AE30-91384D911F3F}">
+                <p184:classification xmlns:p184="http://schemas.microsoft.com/office/powerpoint/2018/4/main" val="ftr"/>
+              </p:ext>
+            </p:extLst>
+          </p:nvPr>
+        </p:nvSpPr>
+        <p:spPr>
+          <a:xfrm>
+            <a:off x="5093462" y="6705600"/>
+            <a:ext cx="1849438" cy="152400"/>
+          </a:xfrm>
+          <a:prstGeom prst="rect">
+            <a:avLst/>
+          </a:prstGeom>
+        </p:spPr>
+        <p:txBody>
+          <a:bodyPr horzOverflow="overflow" lIns="0" tIns="0" rIns="0" bIns="0">
+            <a:spAutoFit/>
+          </a:bodyPr>
+          <a:lstStyle/>
+          <a:p>
+            <a:pPr algn="ctr"/>
+            <a:r>
+              <a:rPr lang="fr-FR" sz="1000">
+                <a:solidFill>
+                  <a:srgbClr val="D89B2B"/>
+                </a:solidFill>
+                <a:latin typeface="Calibri" panose="020F0502020204030204" pitchFamily="34" charset="0"/>
+                <a:cs typeface="Calibri" panose="020F0502020204030204" pitchFamily="34" charset="0"/>
+              </a:rPr>
+              <a:t>Confidential - Company Proprietary</a:t>
+            </a:r>
+          </a:p>
+        </p:txBody>
+      </p:sp>
     </p:spTree>
     <p:extLst>
       <p:ext uri="{BB962C8B-B14F-4D97-AF65-F5344CB8AC3E}">

</xml_diff>